<commit_message>
More Feature of Aspose.Slides v 1.2
</commit_message>
<xml_diff>
--- a/More Features of Aspose.Slides/data/presentation.pptx
+++ b/More Features of Aspose.Slides/data/presentation.pptx
@@ -5,19 +5,20 @@
     <p:sldMasterId id="2147483648" r:id="rId1"/>
   </p:sldMasterIdLst>
   <p:notesMasterIdLst>
-    <p:notesMasterId r:id="rId4"/>
+    <p:notesMasterId r:id="rId5"/>
   </p:notesMasterIdLst>
   <p:handoutMasterIdLst>
-    <p:handoutMasterId r:id="rId5"/>
+    <p:handoutMasterId r:id="rId6"/>
   </p:handoutMasterIdLst>
   <p:sldIdLst>
     <p:sldId id="259" r:id="rId2"/>
     <p:sldId id="260" r:id="rId3"/>
+    <p:sldId id="261" r:id="rId4"/>
   </p:sldIdLst>
   <p:sldSz cx="9144000" cy="6858000" type="screen4x3"/>
   <p:notesSz cx="6858000" cy="9144000"/>
   <p:custDataLst>
-    <p:tags r:id="rId6"/>
+    <p:tags r:id="rId7"/>
   </p:custDataLst>
   <p:defaultTextStyle>
     <a:defPPr>
@@ -146,7 +147,7 @@
   </p:defaultTextStyle>
   <p:extLst>
     <p:ext uri="{EFAFB233-063F-42B5-8137-9DF3F51BA10A}">
-      <p15:sldGuideLst xmlns:p15="http://schemas.microsoft.com/office/powerpoint/2012/main" xmlns="">
+      <p15:sldGuideLst xmlns="" xmlns:p15="http://schemas.microsoft.com/office/powerpoint/2012/main">
         <p15:guide id="1" orient="horz" pos="2160">
           <p15:clr>
             <a:srgbClr val="A4A3A4"/>
@@ -160,7 +161,7 @@
       </p15:sldGuideLst>
     </p:ext>
     <p:ext uri="{2D200454-40CA-4A62-9FC3-DE9A4176ACB9}">
-      <p15:notesGuideLst xmlns:p15="http://schemas.microsoft.com/office/powerpoint/2012/main" xmlns="">
+      <p15:notesGuideLst xmlns="" xmlns:p15="http://schemas.microsoft.com/office/powerpoint/2012/main">
         <p15:guide id="1" orient="horz" pos="2880">
           <p15:clr>
             <a:srgbClr val="A4A3A4"/>
@@ -227,14 +228,14 @@
           <a:effectLst/>
           <a:extLst>
             <a:ext uri="{909E8E84-426E-40DD-AFC4-6F175D3DCCD1}">
-              <a14:hiddenFill xmlns:a14="http://schemas.microsoft.com/office/drawing/2010/main" xmlns="">
+              <a14:hiddenFill xmlns="" xmlns:a14="http://schemas.microsoft.com/office/drawing/2010/main">
                 <a:solidFill>
                   <a:schemeClr val="accent1"/>
                 </a:solidFill>
               </a14:hiddenFill>
             </a:ext>
             <a:ext uri="{91240B29-F687-4F45-9708-019B960494DF}">
-              <a14:hiddenLine xmlns:a14="http://schemas.microsoft.com/office/drawing/2010/main" xmlns="" w="9525">
+              <a14:hiddenLine xmlns="" xmlns:a14="http://schemas.microsoft.com/office/drawing/2010/main" w="9525">
                 <a:solidFill>
                   <a:schemeClr val="tx1"/>
                 </a:solidFill>
@@ -244,7 +245,7 @@
               </a14:hiddenLine>
             </a:ext>
             <a:ext uri="{AF507438-7753-43E0-B8FC-AC1667EBCBE1}">
-              <a14:hiddenEffects xmlns:a14="http://schemas.microsoft.com/office/drawing/2010/main" xmlns="">
+              <a14:hiddenEffects xmlns="" xmlns:a14="http://schemas.microsoft.com/office/drawing/2010/main">
                 <a:effectLst>
                   <a:outerShdw dist="35921" dir="2700000" algn="ctr" rotWithShape="0">
                     <a:schemeClr val="bg2"/>
@@ -298,14 +299,14 @@
           <a:effectLst/>
           <a:extLst>
             <a:ext uri="{909E8E84-426E-40DD-AFC4-6F175D3DCCD1}">
-              <a14:hiddenFill xmlns:a14="http://schemas.microsoft.com/office/drawing/2010/main" xmlns="">
+              <a14:hiddenFill xmlns="" xmlns:a14="http://schemas.microsoft.com/office/drawing/2010/main">
                 <a:solidFill>
                   <a:schemeClr val="accent1"/>
                 </a:solidFill>
               </a14:hiddenFill>
             </a:ext>
             <a:ext uri="{91240B29-F687-4F45-9708-019B960494DF}">
-              <a14:hiddenLine xmlns:a14="http://schemas.microsoft.com/office/drawing/2010/main" xmlns="" w="9525">
+              <a14:hiddenLine xmlns="" xmlns:a14="http://schemas.microsoft.com/office/drawing/2010/main" w="9525">
                 <a:solidFill>
                   <a:schemeClr val="tx1"/>
                 </a:solidFill>
@@ -315,7 +316,7 @@
               </a14:hiddenLine>
             </a:ext>
             <a:ext uri="{AF507438-7753-43E0-B8FC-AC1667EBCBE1}">
-              <a14:hiddenEffects xmlns:a14="http://schemas.microsoft.com/office/drawing/2010/main" xmlns="">
+              <a14:hiddenEffects xmlns="" xmlns:a14="http://schemas.microsoft.com/office/drawing/2010/main">
                 <a:effectLst>
                   <a:outerShdw dist="35921" dir="2700000" algn="ctr" rotWithShape="0">
                     <a:schemeClr val="bg2"/>
@@ -369,14 +370,14 @@
           <a:effectLst/>
           <a:extLst>
             <a:ext uri="{909E8E84-426E-40DD-AFC4-6F175D3DCCD1}">
-              <a14:hiddenFill xmlns:a14="http://schemas.microsoft.com/office/drawing/2010/main" xmlns="">
+              <a14:hiddenFill xmlns="" xmlns:a14="http://schemas.microsoft.com/office/drawing/2010/main">
                 <a:solidFill>
                   <a:schemeClr val="accent1"/>
                 </a:solidFill>
               </a14:hiddenFill>
             </a:ext>
             <a:ext uri="{91240B29-F687-4F45-9708-019B960494DF}">
-              <a14:hiddenLine xmlns:a14="http://schemas.microsoft.com/office/drawing/2010/main" xmlns="" w="9525">
+              <a14:hiddenLine xmlns="" xmlns:a14="http://schemas.microsoft.com/office/drawing/2010/main" w="9525">
                 <a:solidFill>
                   <a:schemeClr val="tx1"/>
                 </a:solidFill>
@@ -386,7 +387,7 @@
               </a14:hiddenLine>
             </a:ext>
             <a:ext uri="{AF507438-7753-43E0-B8FC-AC1667EBCBE1}">
-              <a14:hiddenEffects xmlns:a14="http://schemas.microsoft.com/office/drawing/2010/main" xmlns="">
+              <a14:hiddenEffects xmlns="" xmlns:a14="http://schemas.microsoft.com/office/drawing/2010/main">
                 <a:effectLst>
                   <a:outerShdw dist="35921" dir="2700000" algn="ctr" rotWithShape="0">
                     <a:schemeClr val="bg2"/>
@@ -440,14 +441,14 @@
           <a:effectLst/>
           <a:extLst>
             <a:ext uri="{909E8E84-426E-40DD-AFC4-6F175D3DCCD1}">
-              <a14:hiddenFill xmlns:a14="http://schemas.microsoft.com/office/drawing/2010/main" xmlns="">
+              <a14:hiddenFill xmlns="" xmlns:a14="http://schemas.microsoft.com/office/drawing/2010/main">
                 <a:solidFill>
                   <a:schemeClr val="accent1"/>
                 </a:solidFill>
               </a14:hiddenFill>
             </a:ext>
             <a:ext uri="{91240B29-F687-4F45-9708-019B960494DF}">
-              <a14:hiddenLine xmlns:a14="http://schemas.microsoft.com/office/drawing/2010/main" xmlns="" w="9525">
+              <a14:hiddenLine xmlns="" xmlns:a14="http://schemas.microsoft.com/office/drawing/2010/main" w="9525">
                 <a:solidFill>
                   <a:schemeClr val="tx1"/>
                 </a:solidFill>
@@ -457,7 +458,7 @@
               </a14:hiddenLine>
             </a:ext>
             <a:ext uri="{AF507438-7753-43E0-B8FC-AC1667EBCBE1}">
-              <a14:hiddenEffects xmlns:a14="http://schemas.microsoft.com/office/drawing/2010/main" xmlns="">
+              <a14:hiddenEffects xmlns="" xmlns:a14="http://schemas.microsoft.com/office/drawing/2010/main">
                 <a:effectLst>
                   <a:outerShdw dist="35921" dir="2700000" algn="ctr" rotWithShape="0">
                     <a:schemeClr val="bg2"/>
@@ -496,7 +497,7 @@
     </p:spTree>
     <p:extLst>
       <p:ext uri="{BB962C8B-B14F-4D97-AF65-F5344CB8AC3E}">
-        <p14:creationId xmlns:p14="http://schemas.microsoft.com/office/powerpoint/2010/main" xmlns="" val="3007245515"/>
+        <p14:creationId xmlns="" xmlns:p14="http://schemas.microsoft.com/office/powerpoint/2010/main" val="3007245515"/>
       </p:ext>
     </p:extLst>
   </p:cSld>
@@ -554,14 +555,14 @@
           <a:effectLst/>
           <a:extLst>
             <a:ext uri="{909E8E84-426E-40DD-AFC4-6F175D3DCCD1}">
-              <a14:hiddenFill xmlns:a14="http://schemas.microsoft.com/office/drawing/2010/main" xmlns="">
+              <a14:hiddenFill xmlns="" xmlns:a14="http://schemas.microsoft.com/office/drawing/2010/main">
                 <a:solidFill>
                   <a:schemeClr val="accent1"/>
                 </a:solidFill>
               </a14:hiddenFill>
             </a:ext>
             <a:ext uri="{91240B29-F687-4F45-9708-019B960494DF}">
-              <a14:hiddenLine xmlns:a14="http://schemas.microsoft.com/office/drawing/2010/main" xmlns="" w="9525">
+              <a14:hiddenLine xmlns="" xmlns:a14="http://schemas.microsoft.com/office/drawing/2010/main" w="9525">
                 <a:solidFill>
                   <a:schemeClr val="tx1"/>
                 </a:solidFill>
@@ -571,7 +572,7 @@
               </a14:hiddenLine>
             </a:ext>
             <a:ext uri="{AF507438-7753-43E0-B8FC-AC1667EBCBE1}">
-              <a14:hiddenEffects xmlns:a14="http://schemas.microsoft.com/office/drawing/2010/main" xmlns="">
+              <a14:hiddenEffects xmlns="" xmlns:a14="http://schemas.microsoft.com/office/drawing/2010/main">
                 <a:effectLst>
                   <a:outerShdw dist="35921" dir="2700000" algn="ctr" rotWithShape="0">
                     <a:schemeClr val="bg2"/>
@@ -625,14 +626,14 @@
           <a:effectLst/>
           <a:extLst>
             <a:ext uri="{909E8E84-426E-40DD-AFC4-6F175D3DCCD1}">
-              <a14:hiddenFill xmlns:a14="http://schemas.microsoft.com/office/drawing/2010/main" xmlns="">
+              <a14:hiddenFill xmlns="" xmlns:a14="http://schemas.microsoft.com/office/drawing/2010/main">
                 <a:solidFill>
                   <a:schemeClr val="accent1"/>
                 </a:solidFill>
               </a14:hiddenFill>
             </a:ext>
             <a:ext uri="{91240B29-F687-4F45-9708-019B960494DF}">
-              <a14:hiddenLine xmlns:a14="http://schemas.microsoft.com/office/drawing/2010/main" xmlns="" w="9525">
+              <a14:hiddenLine xmlns="" xmlns:a14="http://schemas.microsoft.com/office/drawing/2010/main" w="9525">
                 <a:solidFill>
                   <a:schemeClr val="tx1"/>
                 </a:solidFill>
@@ -642,7 +643,7 @@
               </a14:hiddenLine>
             </a:ext>
             <a:ext uri="{AF507438-7753-43E0-B8FC-AC1667EBCBE1}">
-              <a14:hiddenEffects xmlns:a14="http://schemas.microsoft.com/office/drawing/2010/main" xmlns="">
+              <a14:hiddenEffects xmlns="" xmlns:a14="http://schemas.microsoft.com/office/drawing/2010/main">
                 <a:effectLst>
                   <a:outerShdw dist="35921" dir="2700000" algn="ctr" rotWithShape="0">
                     <a:schemeClr val="bg2"/>
@@ -701,14 +702,14 @@
           <a:effectLst/>
           <a:extLst>
             <a:ext uri="{909E8E84-426E-40DD-AFC4-6F175D3DCCD1}">
-              <a14:hiddenFill xmlns:a14="http://schemas.microsoft.com/office/drawing/2010/main" xmlns="">
+              <a14:hiddenFill xmlns="" xmlns:a14="http://schemas.microsoft.com/office/drawing/2010/main">
                 <a:solidFill>
                   <a:srgbClr val="FFFFFF"/>
                 </a:solidFill>
               </a14:hiddenFill>
             </a:ext>
             <a:ext uri="{AF507438-7753-43E0-B8FC-AC1667EBCBE1}">
-              <a14:hiddenEffects xmlns:a14="http://schemas.microsoft.com/office/drawing/2010/main" xmlns="">
+              <a14:hiddenEffects xmlns="" xmlns:a14="http://schemas.microsoft.com/office/drawing/2010/main">
                 <a:effectLst>
                   <a:outerShdw dist="35921" dir="2700000" algn="ctr" rotWithShape="0">
                     <a:srgbClr val="808080"/>
@@ -717,7 +718,7 @@
               </a14:hiddenEffects>
             </a:ext>
             <a:ext uri="{53640926-AAD7-44D8-BBD7-CCE9431645EC}">
-              <a14:shadowObscured xmlns:a14="http://schemas.microsoft.com/office/drawing/2010/main" xmlns="" val="1"/>
+              <a14:shadowObscured xmlns="" xmlns:a14="http://schemas.microsoft.com/office/drawing/2010/main" val="1"/>
             </a:ext>
           </a:extLst>
         </p:spPr>
@@ -747,14 +748,14 @@
           <a:effectLst/>
           <a:extLst>
             <a:ext uri="{909E8E84-426E-40DD-AFC4-6F175D3DCCD1}">
-              <a14:hiddenFill xmlns:a14="http://schemas.microsoft.com/office/drawing/2010/main" xmlns="">
+              <a14:hiddenFill xmlns="" xmlns:a14="http://schemas.microsoft.com/office/drawing/2010/main">
                 <a:solidFill>
                   <a:schemeClr val="accent1"/>
                 </a:solidFill>
               </a14:hiddenFill>
             </a:ext>
             <a:ext uri="{91240B29-F687-4F45-9708-019B960494DF}">
-              <a14:hiddenLine xmlns:a14="http://schemas.microsoft.com/office/drawing/2010/main" xmlns="" w="9525">
+              <a14:hiddenLine xmlns="" xmlns:a14="http://schemas.microsoft.com/office/drawing/2010/main" w="9525">
                 <a:solidFill>
                   <a:schemeClr val="tx1"/>
                 </a:solidFill>
@@ -764,7 +765,7 @@
               </a14:hiddenLine>
             </a:ext>
             <a:ext uri="{AF507438-7753-43E0-B8FC-AC1667EBCBE1}">
-              <a14:hiddenEffects xmlns:a14="http://schemas.microsoft.com/office/drawing/2010/main" xmlns="">
+              <a14:hiddenEffects xmlns="" xmlns:a14="http://schemas.microsoft.com/office/drawing/2010/main">
                 <a:effectLst>
                   <a:outerShdw dist="35921" dir="2700000" algn="ctr" rotWithShape="0">
                     <a:schemeClr val="bg2"/>
@@ -843,14 +844,14 @@
           <a:effectLst/>
           <a:extLst>
             <a:ext uri="{909E8E84-426E-40DD-AFC4-6F175D3DCCD1}">
-              <a14:hiddenFill xmlns:a14="http://schemas.microsoft.com/office/drawing/2010/main" xmlns="">
+              <a14:hiddenFill xmlns="" xmlns:a14="http://schemas.microsoft.com/office/drawing/2010/main">
                 <a:solidFill>
                   <a:schemeClr val="accent1"/>
                 </a:solidFill>
               </a14:hiddenFill>
             </a:ext>
             <a:ext uri="{91240B29-F687-4F45-9708-019B960494DF}">
-              <a14:hiddenLine xmlns:a14="http://schemas.microsoft.com/office/drawing/2010/main" xmlns="" w="9525">
+              <a14:hiddenLine xmlns="" xmlns:a14="http://schemas.microsoft.com/office/drawing/2010/main" w="9525">
                 <a:solidFill>
                   <a:schemeClr val="tx1"/>
                 </a:solidFill>
@@ -860,7 +861,7 @@
               </a14:hiddenLine>
             </a:ext>
             <a:ext uri="{AF507438-7753-43E0-B8FC-AC1667EBCBE1}">
-              <a14:hiddenEffects xmlns:a14="http://schemas.microsoft.com/office/drawing/2010/main" xmlns="">
+              <a14:hiddenEffects xmlns="" xmlns:a14="http://schemas.microsoft.com/office/drawing/2010/main">
                 <a:effectLst>
                   <a:outerShdw dist="35921" dir="2700000" algn="ctr" rotWithShape="0">
                     <a:schemeClr val="bg2"/>
@@ -914,14 +915,14 @@
           <a:effectLst/>
           <a:extLst>
             <a:ext uri="{909E8E84-426E-40DD-AFC4-6F175D3DCCD1}">
-              <a14:hiddenFill xmlns:a14="http://schemas.microsoft.com/office/drawing/2010/main" xmlns="">
+              <a14:hiddenFill xmlns="" xmlns:a14="http://schemas.microsoft.com/office/drawing/2010/main">
                 <a:solidFill>
                   <a:schemeClr val="accent1"/>
                 </a:solidFill>
               </a14:hiddenFill>
             </a:ext>
             <a:ext uri="{91240B29-F687-4F45-9708-019B960494DF}">
-              <a14:hiddenLine xmlns:a14="http://schemas.microsoft.com/office/drawing/2010/main" xmlns="" w="9525">
+              <a14:hiddenLine xmlns="" xmlns:a14="http://schemas.microsoft.com/office/drawing/2010/main" w="9525">
                 <a:solidFill>
                   <a:schemeClr val="tx1"/>
                 </a:solidFill>
@@ -931,7 +932,7 @@
               </a14:hiddenLine>
             </a:ext>
             <a:ext uri="{AF507438-7753-43E0-B8FC-AC1667EBCBE1}">
-              <a14:hiddenEffects xmlns:a14="http://schemas.microsoft.com/office/drawing/2010/main" xmlns="">
+              <a14:hiddenEffects xmlns="" xmlns:a14="http://schemas.microsoft.com/office/drawing/2010/main">
                 <a:effectLst>
                   <a:outerShdw dist="35921" dir="2700000" algn="ctr" rotWithShape="0">
                     <a:schemeClr val="bg2"/>
@@ -970,7 +971,7 @@
     </p:spTree>
     <p:extLst>
       <p:ext uri="{BB962C8B-B14F-4D97-AF65-F5344CB8AC3E}">
-        <p14:creationId xmlns:p14="http://schemas.microsoft.com/office/powerpoint/2010/main" xmlns="" val="1446403595"/>
+        <p14:creationId xmlns="" xmlns:p14="http://schemas.microsoft.com/office/powerpoint/2010/main" val="1446403595"/>
       </p:ext>
     </p:extLst>
   </p:cSld>
@@ -1308,7 +1309,7 @@
     </p:spTree>
     <p:extLst>
       <p:ext uri="{BB962C8B-B14F-4D97-AF65-F5344CB8AC3E}">
-        <p14:creationId xmlns:p14="http://schemas.microsoft.com/office/powerpoint/2010/main" xmlns="" val="1042041417"/>
+        <p14:creationId xmlns="" xmlns:p14="http://schemas.microsoft.com/office/powerpoint/2010/main" val="1042041417"/>
       </p:ext>
     </p:extLst>
   </p:cSld>
@@ -1504,7 +1505,7 @@
     </p:spTree>
     <p:extLst>
       <p:ext uri="{BB962C8B-B14F-4D97-AF65-F5344CB8AC3E}">
-        <p14:creationId xmlns:p14="http://schemas.microsoft.com/office/powerpoint/2010/main" xmlns="" val="2471164181"/>
+        <p14:creationId xmlns="" xmlns:p14="http://schemas.microsoft.com/office/powerpoint/2010/main" val="2471164181"/>
       </p:ext>
     </p:extLst>
   </p:cSld>
@@ -1710,7 +1711,7 @@
     </p:spTree>
     <p:extLst>
       <p:ext uri="{BB962C8B-B14F-4D97-AF65-F5344CB8AC3E}">
-        <p14:creationId xmlns:p14="http://schemas.microsoft.com/office/powerpoint/2010/main" xmlns="" val="1695375460"/>
+        <p14:creationId xmlns="" xmlns:p14="http://schemas.microsoft.com/office/powerpoint/2010/main" val="1695375460"/>
       </p:ext>
     </p:extLst>
   </p:cSld>
@@ -1906,7 +1907,7 @@
     </p:spTree>
     <p:extLst>
       <p:ext uri="{BB962C8B-B14F-4D97-AF65-F5344CB8AC3E}">
-        <p14:creationId xmlns:p14="http://schemas.microsoft.com/office/powerpoint/2010/main" xmlns="" val="2413797716"/>
+        <p14:creationId xmlns="" xmlns:p14="http://schemas.microsoft.com/office/powerpoint/2010/main" val="2413797716"/>
       </p:ext>
     </p:extLst>
   </p:cSld>
@@ -2124,7 +2125,7 @@
     </p:spTree>
     <p:extLst>
       <p:ext uri="{BB962C8B-B14F-4D97-AF65-F5344CB8AC3E}">
-        <p14:creationId xmlns:p14="http://schemas.microsoft.com/office/powerpoint/2010/main" xmlns="" val="1707475330"/>
+        <p14:creationId xmlns="" xmlns:p14="http://schemas.microsoft.com/office/powerpoint/2010/main" val="1707475330"/>
       </p:ext>
     </p:extLst>
   </p:cSld>
@@ -2438,7 +2439,7 @@
     </p:spTree>
     <p:extLst>
       <p:ext uri="{BB962C8B-B14F-4D97-AF65-F5344CB8AC3E}">
-        <p14:creationId xmlns:p14="http://schemas.microsoft.com/office/powerpoint/2010/main" xmlns="" val="2163087598"/>
+        <p14:creationId xmlns="" xmlns:p14="http://schemas.microsoft.com/office/powerpoint/2010/main" val="2163087598"/>
       </p:ext>
     </p:extLst>
   </p:cSld>
@@ -2887,7 +2888,7 @@
     </p:spTree>
     <p:extLst>
       <p:ext uri="{BB962C8B-B14F-4D97-AF65-F5344CB8AC3E}">
-        <p14:creationId xmlns:p14="http://schemas.microsoft.com/office/powerpoint/2010/main" xmlns="" val="406350859"/>
+        <p14:creationId xmlns="" xmlns:p14="http://schemas.microsoft.com/office/powerpoint/2010/main" val="406350859"/>
       </p:ext>
     </p:extLst>
   </p:cSld>
@@ -3031,7 +3032,7 @@
     </p:spTree>
     <p:extLst>
       <p:ext uri="{BB962C8B-B14F-4D97-AF65-F5344CB8AC3E}">
-        <p14:creationId xmlns:p14="http://schemas.microsoft.com/office/powerpoint/2010/main" xmlns="" val="532666043"/>
+        <p14:creationId xmlns="" xmlns:p14="http://schemas.microsoft.com/office/powerpoint/2010/main" val="532666043"/>
       </p:ext>
     </p:extLst>
   </p:cSld>
@@ -3152,7 +3153,7 @@
     </p:spTree>
     <p:extLst>
       <p:ext uri="{BB962C8B-B14F-4D97-AF65-F5344CB8AC3E}">
-        <p14:creationId xmlns:p14="http://schemas.microsoft.com/office/powerpoint/2010/main" xmlns="" val="2040195224"/>
+        <p14:creationId xmlns="" xmlns:p14="http://schemas.microsoft.com/office/powerpoint/2010/main" val="2040195224"/>
       </p:ext>
     </p:extLst>
   </p:cSld>
@@ -3455,7 +3456,7 @@
     </p:spTree>
     <p:extLst>
       <p:ext uri="{BB962C8B-B14F-4D97-AF65-F5344CB8AC3E}">
-        <p14:creationId xmlns:p14="http://schemas.microsoft.com/office/powerpoint/2010/main" xmlns="" val="2263758934"/>
+        <p14:creationId xmlns="" xmlns:p14="http://schemas.microsoft.com/office/powerpoint/2010/main" val="2263758934"/>
       </p:ext>
     </p:extLst>
   </p:cSld>
@@ -3735,7 +3736,7 @@
     </p:spTree>
     <p:extLst>
       <p:ext uri="{BB962C8B-B14F-4D97-AF65-F5344CB8AC3E}">
-        <p14:creationId xmlns:p14="http://schemas.microsoft.com/office/powerpoint/2010/main" xmlns="" val="138415530"/>
+        <p14:creationId xmlns="" xmlns:p14="http://schemas.microsoft.com/office/powerpoint/2010/main" val="138415530"/>
       </p:ext>
     </p:extLst>
   </p:cSld>
@@ -3795,14 +3796,14 @@
           <a:effectLst/>
           <a:extLst>
             <a:ext uri="{909E8E84-426E-40DD-AFC4-6F175D3DCCD1}">
-              <a14:hiddenFill xmlns:a14="http://schemas.microsoft.com/office/drawing/2010/main" xmlns="">
+              <a14:hiddenFill xmlns="" xmlns:a14="http://schemas.microsoft.com/office/drawing/2010/main">
                 <a:solidFill>
                   <a:schemeClr val="accent1"/>
                 </a:solidFill>
               </a14:hiddenFill>
             </a:ext>
             <a:ext uri="{91240B29-F687-4F45-9708-019B960494DF}">
-              <a14:hiddenLine xmlns:a14="http://schemas.microsoft.com/office/drawing/2010/main" xmlns="" w="9525">
+              <a14:hiddenLine xmlns="" xmlns:a14="http://schemas.microsoft.com/office/drawing/2010/main" w="9525">
                 <a:solidFill>
                   <a:schemeClr val="tx1"/>
                 </a:solidFill>
@@ -3812,7 +3813,7 @@
               </a14:hiddenLine>
             </a:ext>
             <a:ext uri="{AF507438-7753-43E0-B8FC-AC1667EBCBE1}">
-              <a14:hiddenEffects xmlns:a14="http://schemas.microsoft.com/office/drawing/2010/main" xmlns="">
+              <a14:hiddenEffects xmlns="" xmlns:a14="http://schemas.microsoft.com/office/drawing/2010/main">
                 <a:effectLst>
                   <a:outerShdw dist="35921" dir="2700000" algn="ctr" rotWithShape="0">
                     <a:schemeClr val="bg2"/>
@@ -3863,14 +3864,14 @@
           <a:effectLst/>
           <a:extLst>
             <a:ext uri="{909E8E84-426E-40DD-AFC4-6F175D3DCCD1}">
-              <a14:hiddenFill xmlns:a14="http://schemas.microsoft.com/office/drawing/2010/main" xmlns="">
+              <a14:hiddenFill xmlns="" xmlns:a14="http://schemas.microsoft.com/office/drawing/2010/main">
                 <a:solidFill>
                   <a:schemeClr val="accent1"/>
                 </a:solidFill>
               </a14:hiddenFill>
             </a:ext>
             <a:ext uri="{91240B29-F687-4F45-9708-019B960494DF}">
-              <a14:hiddenLine xmlns:a14="http://schemas.microsoft.com/office/drawing/2010/main" xmlns="" w="9525">
+              <a14:hiddenLine xmlns="" xmlns:a14="http://schemas.microsoft.com/office/drawing/2010/main" w="9525">
                 <a:solidFill>
                   <a:schemeClr val="tx1"/>
                 </a:solidFill>
@@ -3880,7 +3881,7 @@
               </a14:hiddenLine>
             </a:ext>
             <a:ext uri="{AF507438-7753-43E0-B8FC-AC1667EBCBE1}">
-              <a14:hiddenEffects xmlns:a14="http://schemas.microsoft.com/office/drawing/2010/main" xmlns="">
+              <a14:hiddenEffects xmlns="" xmlns:a14="http://schemas.microsoft.com/office/drawing/2010/main">
                 <a:effectLst>
                   <a:outerShdw dist="35921" dir="2700000" algn="ctr" rotWithShape="0">
                     <a:schemeClr val="bg2"/>
@@ -3959,14 +3960,14 @@
           <a:effectLst/>
           <a:extLst>
             <a:ext uri="{909E8E84-426E-40DD-AFC4-6F175D3DCCD1}">
-              <a14:hiddenFill xmlns:a14="http://schemas.microsoft.com/office/drawing/2010/main" xmlns="">
+              <a14:hiddenFill xmlns="" xmlns:a14="http://schemas.microsoft.com/office/drawing/2010/main">
                 <a:solidFill>
                   <a:schemeClr val="accent1"/>
                 </a:solidFill>
               </a14:hiddenFill>
             </a:ext>
             <a:ext uri="{91240B29-F687-4F45-9708-019B960494DF}">
-              <a14:hiddenLine xmlns:a14="http://schemas.microsoft.com/office/drawing/2010/main" xmlns="" w="9525">
+              <a14:hiddenLine xmlns="" xmlns:a14="http://schemas.microsoft.com/office/drawing/2010/main" w="9525">
                 <a:solidFill>
                   <a:schemeClr val="tx1"/>
                 </a:solidFill>
@@ -3976,7 +3977,7 @@
               </a14:hiddenLine>
             </a:ext>
             <a:ext uri="{AF507438-7753-43E0-B8FC-AC1667EBCBE1}">
-              <a14:hiddenEffects xmlns:a14="http://schemas.microsoft.com/office/drawing/2010/main" xmlns="">
+              <a14:hiddenEffects xmlns="" xmlns:a14="http://schemas.microsoft.com/office/drawing/2010/main">
                 <a:effectLst>
                   <a:outerShdw dist="35921" dir="2700000" algn="ctr" rotWithShape="0">
                     <a:schemeClr val="bg2"/>
@@ -4030,14 +4031,14 @@
           <a:effectLst/>
           <a:extLst>
             <a:ext uri="{909E8E84-426E-40DD-AFC4-6F175D3DCCD1}">
-              <a14:hiddenFill xmlns:a14="http://schemas.microsoft.com/office/drawing/2010/main" xmlns="">
+              <a14:hiddenFill xmlns="" xmlns:a14="http://schemas.microsoft.com/office/drawing/2010/main">
                 <a:solidFill>
                   <a:schemeClr val="accent1"/>
                 </a:solidFill>
               </a14:hiddenFill>
             </a:ext>
             <a:ext uri="{91240B29-F687-4F45-9708-019B960494DF}">
-              <a14:hiddenLine xmlns:a14="http://schemas.microsoft.com/office/drawing/2010/main" xmlns="" w="9525">
+              <a14:hiddenLine xmlns="" xmlns:a14="http://schemas.microsoft.com/office/drawing/2010/main" w="9525">
                 <a:solidFill>
                   <a:schemeClr val="tx1"/>
                 </a:solidFill>
@@ -4047,7 +4048,7 @@
               </a14:hiddenLine>
             </a:ext>
             <a:ext uri="{AF507438-7753-43E0-B8FC-AC1667EBCBE1}">
-              <a14:hiddenEffects xmlns:a14="http://schemas.microsoft.com/office/drawing/2010/main" xmlns="">
+              <a14:hiddenEffects xmlns="" xmlns:a14="http://schemas.microsoft.com/office/drawing/2010/main">
                 <a:effectLst>
                   <a:outerShdw dist="35921" dir="2700000" algn="ctr" rotWithShape="0">
                     <a:schemeClr val="bg2"/>
@@ -4101,14 +4102,14 @@
           <a:effectLst/>
           <a:extLst>
             <a:ext uri="{909E8E84-426E-40DD-AFC4-6F175D3DCCD1}">
-              <a14:hiddenFill xmlns:a14="http://schemas.microsoft.com/office/drawing/2010/main" xmlns="">
+              <a14:hiddenFill xmlns="" xmlns:a14="http://schemas.microsoft.com/office/drawing/2010/main">
                 <a:solidFill>
                   <a:schemeClr val="accent1"/>
                 </a:solidFill>
               </a14:hiddenFill>
             </a:ext>
             <a:ext uri="{91240B29-F687-4F45-9708-019B960494DF}">
-              <a14:hiddenLine xmlns:a14="http://schemas.microsoft.com/office/drawing/2010/main" xmlns="" w="9525">
+              <a14:hiddenLine xmlns="" xmlns:a14="http://schemas.microsoft.com/office/drawing/2010/main" w="9525">
                 <a:solidFill>
                   <a:schemeClr val="tx1"/>
                 </a:solidFill>
@@ -4118,7 +4119,7 @@
               </a14:hiddenLine>
             </a:ext>
             <a:ext uri="{AF507438-7753-43E0-B8FC-AC1667EBCBE1}">
-              <a14:hiddenEffects xmlns:a14="http://schemas.microsoft.com/office/drawing/2010/main" xmlns="">
+              <a14:hiddenEffects xmlns="" xmlns:a14="http://schemas.microsoft.com/office/drawing/2010/main">
                 <a:effectLst>
                   <a:outerShdw dist="35921" dir="2700000" algn="ctr" rotWithShape="0">
                     <a:schemeClr val="bg2"/>
@@ -4725,20 +4726,10 @@
                   </a:schemeClr>
                 </a:solidFill>
               </a:rPr>
-              <a:t>Presentation – </a:t>
-            </a:r>
-            <a:r>
-              <a:rPr lang="en-US" sz="2800" b="1">
-                <a:solidFill>
-                  <a:schemeClr val="bg1">
-                    <a:lumMod val="50000"/>
-                  </a:schemeClr>
-                </a:solidFill>
-              </a:rPr>
-              <a:t>Slide </a:t>
-            </a:r>
-            <a:r>
-              <a:rPr lang="en-US" sz="2800" b="1" smtClean="0">
+              <a:t>Presentation – Slide </a:t>
+            </a:r>
+            <a:r>
+              <a:rPr lang="en-US" sz="2800" b="1" dirty="0" smtClean="0">
                 <a:solidFill>
                   <a:schemeClr val="bg1">
                     <a:lumMod val="50000"/>
@@ -4746,6 +4737,106 @@
                 </a:solidFill>
               </a:rPr>
               <a:t>2</a:t>
+            </a:r>
+            <a:endParaRPr lang="en-US" sz="2800" b="1" dirty="0">
+              <a:solidFill>
+                <a:schemeClr val="bg1">
+                  <a:lumMod val="50000"/>
+                </a:schemeClr>
+              </a:solidFill>
+            </a:endParaRPr>
+          </a:p>
+        </p:txBody>
+      </p:sp>
+    </p:spTree>
+  </p:cSld>
+  <p:clrMapOvr>
+    <a:masterClrMapping/>
+  </p:clrMapOvr>
+</p:sld>
+</file>
+
+<file path=ppt/slides/slide3.xml><?xml version="1.0" encoding="utf-8"?>
+<p:sld xmlns:a="http://schemas.openxmlformats.org/drawingml/2006/main" xmlns:r="http://schemas.openxmlformats.org/officeDocument/2006/relationships" xmlns:p="http://schemas.openxmlformats.org/presentationml/2006/main">
+  <p:cSld>
+    <p:spTree>
+      <p:nvGrpSpPr>
+        <p:cNvPr id="1" name=""/>
+        <p:cNvGrpSpPr/>
+        <p:nvPr/>
+      </p:nvGrpSpPr>
+      <p:grpSpPr>
+        <a:xfrm>
+          <a:off x="0" y="0"/>
+          <a:ext cx="0" cy="0"/>
+          <a:chOff x="0" y="0"/>
+          <a:chExt cx="0" cy="0"/>
+        </a:xfrm>
+      </p:grpSpPr>
+      <p:sp>
+        <p:nvSpPr>
+          <p:cNvPr id="2" name="TextBox 1"/>
+          <p:cNvSpPr txBox="1"/>
+          <p:nvPr/>
+        </p:nvSpPr>
+        <p:spPr>
+          <a:xfrm>
+            <a:off x="1524000" y="914400"/>
+            <a:ext cx="6019800" cy="523875"/>
+          </a:xfrm>
+          <a:prstGeom prst="rect">
+            <a:avLst/>
+          </a:prstGeom>
+          <a:noFill/>
+        </p:spPr>
+        <p:txBody>
+          <a:bodyPr>
+            <a:spAutoFit/>
+          </a:bodyPr>
+          <a:lstStyle/>
+          <a:p>
+            <a:pPr algn="ctr" eaLnBrk="1" hangingPunct="1">
+              <a:defRPr/>
+            </a:pPr>
+            <a:r>
+              <a:rPr lang="en-US" sz="2800" b="1" dirty="0">
+                <a:solidFill>
+                  <a:schemeClr val="bg1">
+                    <a:lumMod val="50000"/>
+                  </a:schemeClr>
+                </a:solidFill>
+              </a:rPr>
+              <a:t>Simple</a:t>
+            </a:r>
+            <a:r>
+              <a:rPr lang="en-US" sz="2800" dirty="0">
+                <a:solidFill>
+                  <a:schemeClr val="bg1">
+                    <a:lumMod val="50000"/>
+                  </a:schemeClr>
+                </a:solidFill>
+              </a:rPr>
+              <a:t> </a:t>
+            </a:r>
+            <a:r>
+              <a:rPr lang="en-US" sz="2800" b="1" dirty="0">
+                <a:solidFill>
+                  <a:schemeClr val="bg1">
+                    <a:lumMod val="50000"/>
+                  </a:schemeClr>
+                </a:solidFill>
+              </a:rPr>
+              <a:t>Presentation – Slide </a:t>
+            </a:r>
+            <a:r>
+              <a:rPr lang="en-US" sz="2800" b="1" dirty="0" smtClean="0">
+                <a:solidFill>
+                  <a:schemeClr val="bg1">
+                    <a:lumMod val="50000"/>
+                  </a:schemeClr>
+                </a:solidFill>
+              </a:rPr>
+              <a:t>3</a:t>
             </a:r>
             <a:endParaRPr lang="en-US" sz="2800" b="1" dirty="0">
               <a:solidFill>
@@ -5463,7 +5554,7 @@
   </a:extraClrSchemeLst>
   <a:extLst>
     <a:ext uri="{05A4C25C-085E-4340-85A3-A5531E510DB2}">
-      <thm15:themeFamily xmlns:thm15="http://schemas.microsoft.com/office/thememl/2012/main" xmlns="" name="Office Theme" id="{62F939B6-93AF-4DB8-9C6B-D6C7DFDC589F}" vid="{4A3C46E8-61CC-4603-A589-7422A47A8E4A}"/>
+      <thm15:themeFamily xmlns="" xmlns:thm15="http://schemas.microsoft.com/office/thememl/2012/main" name="Office Theme" id="{62F939B6-93AF-4DB8-9C6B-D6C7DFDC589F}" vid="{4A3C46E8-61CC-4603-A589-7422A47A8E4A}"/>
     </a:ext>
   </a:extLst>
 </a:theme>
@@ -5724,7 +5815,7 @@
   <a:extraClrSchemeLst/>
   <a:extLst>
     <a:ext uri="{05A4C25C-085E-4340-85A3-A5531E510DB2}">
-      <thm15:themeFamily xmlns:thm15="http://schemas.microsoft.com/office/thememl/2012/main" xmlns="" name="Office Theme" id="{62F939B6-93AF-4DB8-9C6B-D6C7DFDC589F}" vid="{4A3C46E8-61CC-4603-A589-7422A47A8E4A}"/>
+      <thm15:themeFamily xmlns="" xmlns:thm15="http://schemas.microsoft.com/office/thememl/2012/main" name="Office Theme" id="{62F939B6-93AF-4DB8-9C6B-D6C7DFDC589F}" vid="{4A3C46E8-61CC-4603-A589-7422A47A8E4A}"/>
     </a:ext>
   </a:extLst>
 </a:theme>
@@ -5985,7 +6076,7 @@
   <a:extraClrSchemeLst/>
   <a:extLst>
     <a:ext uri="{05A4C25C-085E-4340-85A3-A5531E510DB2}">
-      <thm15:themeFamily xmlns:thm15="http://schemas.microsoft.com/office/thememl/2012/main" xmlns="" name="Office Theme" id="{62F939B6-93AF-4DB8-9C6B-D6C7DFDC589F}" vid="{4A3C46E8-61CC-4603-A589-7422A47A8E4A}"/>
+      <thm15:themeFamily xmlns="" xmlns:thm15="http://schemas.microsoft.com/office/thememl/2012/main" name="Office Theme" id="{62F939B6-93AF-4DB8-9C6B-D6C7DFDC589F}" vid="{4A3C46E8-61CC-4603-A589-7422A47A8E4A}"/>
     </a:ext>
   </a:extLst>
 </a:theme>

</xml_diff>